<commit_message>
Agregando recursos y tutorial ggplot
</commit_message>
<xml_diff>
--- a/W7_Analisis_de_genes_funcionales.pptx
+++ b/W7_Analisis_de_genes_funcionales.pptx
@@ -6,8 +6,8 @@
   </p:sldMasterIdLst>
   <p:sldIdLst>
     <p:sldId id="259" r:id="rId2"/>
-    <p:sldId id="260" r:id="rId3"/>
-    <p:sldId id="261" r:id="rId4"/>
+    <p:sldId id="261" r:id="rId3"/>
+    <p:sldId id="260" r:id="rId4"/>
     <p:sldId id="263" r:id="rId5"/>
     <p:sldId id="294" r:id="rId6"/>
     <p:sldId id="264" r:id="rId7"/>
@@ -4666,13 +4666,6 @@
               <a:t>Erick Cardenas Poire</a:t>
             </a:r>
           </a:p>
-          <a:p>
-            <a:pPr algn="ctr"/>
-            <a:r>
-              <a:rPr lang="en-AU" dirty="0"/>
-              <a:t>University of British Columbia</a:t>
-            </a:r>
-          </a:p>
         </p:txBody>
       </p:sp>
     </p:spTree>
@@ -7659,20 +7652,21 @@
         </p:nvSpPr>
         <p:spPr/>
         <p:txBody>
-          <a:bodyPr/>
-          <a:lstStyle/>
-          <a:p>
-            <a:r>
-              <a:rPr lang="en-US" dirty="0" err="1"/>
-              <a:t>Objetivos</a:t>
-            </a:r>
-            <a:endParaRPr lang="en-US" dirty="0"/>
-          </a:p>
-        </p:txBody>
-      </p:sp>
-      <p:sp>
-        <p:nvSpPr>
-          <p:cNvPr id="6" name="Content Placeholder 5"/>
+          <a:bodyPr>
+            <a:normAutofit/>
+          </a:bodyPr>
+          <a:lstStyle/>
+          <a:p>
+            <a:r>
+              <a:rPr lang="es-PE"/>
+              <a:t>Volviendo a la biodiversidad</a:t>
+            </a:r>
+          </a:p>
+        </p:txBody>
+      </p:sp>
+      <p:sp>
+        <p:nvSpPr>
+          <p:cNvPr id="3" name="Content Placeholder 2"/>
           <p:cNvSpPr>
             <a:spLocks noGrp="1"/>
           </p:cNvSpPr>
@@ -7682,31 +7676,158 @@
         </p:nvSpPr>
         <p:spPr/>
         <p:txBody>
-          <a:bodyPr/>
-          <a:lstStyle/>
-          <a:p>
-            <a:r>
-              <a:rPr lang="es-PE" dirty="0"/>
-              <a:t>Comparar y contrastar análisis de genes funcionales y taxonómicos</a:t>
-            </a:r>
-          </a:p>
-          <a:p>
-            <a:r>
-              <a:rPr lang="es-PE" dirty="0"/>
-              <a:t>Entender que es un modelo de </a:t>
-            </a:r>
-            <a:r>
-              <a:rPr lang="es-PE" dirty="0" err="1"/>
-              <a:t>Hammer</a:t>
-            </a:r>
-            <a:endParaRPr lang="es-PE" dirty="0"/>
+          <a:bodyPr>
+            <a:normAutofit fontScale="85000" lnSpcReduction="20000"/>
+          </a:bodyPr>
+          <a:lstStyle/>
+          <a:p>
+            <a:pPr marL="349355" indent="0">
+              <a:buNone/>
+              <a:tabLst>
+                <a:tab pos="1017588" algn="l"/>
+                <a:tab pos="1017588" algn="l"/>
+                <a:tab pos="1017588" algn="l"/>
+              </a:tabLst>
+            </a:pPr>
+            <a:endParaRPr lang="es-PE" sz="3600" dirty="0"/>
+          </a:p>
+          <a:p>
+            <a:pPr marL="349355" indent="0">
+              <a:buNone/>
+              <a:tabLst>
+                <a:tab pos="1017588" algn="l"/>
+                <a:tab pos="1017588" algn="l"/>
+                <a:tab pos="1017588" algn="l"/>
+              </a:tabLst>
+            </a:pPr>
+            <a:r>
+              <a:rPr lang="es-PE" sz="3600" dirty="0" err="1"/>
+              <a:t>Magurran</a:t>
+            </a:r>
+            <a:r>
+              <a:rPr lang="es-PE" sz="3600" dirty="0"/>
+              <a:t>:</a:t>
+            </a:r>
+          </a:p>
+          <a:p>
+            <a:pPr marL="692255" indent="-342900">
+              <a:tabLst>
+                <a:tab pos="1017588" algn="l"/>
+                <a:tab pos="1017588" algn="l"/>
+                <a:tab pos="1017588" algn="l"/>
+              </a:tabLst>
+            </a:pPr>
+            <a:endParaRPr lang="es-PE" sz="2800" dirty="0"/>
+          </a:p>
+          <a:p>
+            <a:pPr marL="692255" indent="-342900">
+              <a:tabLst>
+                <a:tab pos="1017588" algn="l"/>
+                <a:tab pos="1017588" algn="l"/>
+                <a:tab pos="1017588" algn="l"/>
+              </a:tabLst>
+            </a:pPr>
+            <a:r>
+              <a:rPr lang="es-PE" sz="3200" dirty="0"/>
+              <a:t>Variedad y abundancia de especies en una unidad de estudio definida.</a:t>
+            </a:r>
+          </a:p>
+          <a:p>
+            <a:pPr marL="692255" indent="-342900">
+              <a:tabLst>
+                <a:tab pos="1017588" algn="l"/>
+                <a:tab pos="1017588" algn="l"/>
+                <a:tab pos="1017588" algn="l"/>
+              </a:tabLst>
+            </a:pPr>
+            <a:endParaRPr lang="es-PE" sz="3200" dirty="0"/>
+          </a:p>
+          <a:p>
+            <a:pPr marL="692255" indent="-342900">
+              <a:tabLst>
+                <a:tab pos="1017588" algn="l"/>
+                <a:tab pos="1017588" algn="l"/>
+                <a:tab pos="1017588" algn="l"/>
+              </a:tabLst>
+            </a:pPr>
+            <a:endParaRPr lang="es-PE" sz="3200" dirty="0"/>
+          </a:p>
+          <a:p>
+            <a:pPr marL="349355" indent="0">
+              <a:buNone/>
+              <a:tabLst>
+                <a:tab pos="1017588" algn="l"/>
+                <a:tab pos="1017588" algn="l"/>
+                <a:tab pos="1017588" algn="l"/>
+              </a:tabLst>
+            </a:pPr>
+            <a:r>
+              <a:rPr lang="es-PE" sz="3000" dirty="0"/>
+              <a:t>Biodiversidad:</a:t>
+            </a:r>
+          </a:p>
+          <a:p>
+            <a:pPr marL="692255" indent="-342900">
+              <a:tabLst>
+                <a:tab pos="1017588" algn="l"/>
+                <a:tab pos="1017588" algn="l"/>
+                <a:tab pos="1017588" algn="l"/>
+              </a:tabLst>
+            </a:pPr>
+            <a:endParaRPr lang="es-PE" sz="3200" dirty="0"/>
+          </a:p>
+          <a:p>
+            <a:pPr marL="692255" indent="-342900">
+              <a:tabLst>
+                <a:tab pos="1017588" algn="l"/>
+                <a:tab pos="1017588" algn="l"/>
+                <a:tab pos="1017588" algn="l"/>
+              </a:tabLst>
+            </a:pPr>
+            <a:r>
+              <a:rPr lang="es-PE" sz="3200" dirty="0"/>
+              <a:t>Totalidad de genes, especies, y ecosistemas de una región</a:t>
+            </a:r>
+          </a:p>
+          <a:p>
+            <a:pPr marL="712240" lvl="1" indent="0">
+              <a:buNone/>
+              <a:tabLst>
+                <a:tab pos="1017588" algn="l"/>
+                <a:tab pos="1017588" algn="l"/>
+                <a:tab pos="1017588" algn="l"/>
+              </a:tabLst>
+            </a:pPr>
+            <a:endParaRPr lang="es-PE" sz="2900" dirty="0"/>
+          </a:p>
+          <a:p>
+            <a:pPr marL="349355" indent="0">
+              <a:buNone/>
+              <a:tabLst>
+                <a:tab pos="1017588" algn="l"/>
+                <a:tab pos="1017588" algn="l"/>
+                <a:tab pos="1017588" algn="l"/>
+              </a:tabLst>
+            </a:pPr>
+            <a:endParaRPr lang="es-PE" sz="3200" dirty="0"/>
+          </a:p>
+          <a:p>
+            <a:pPr marL="349355" indent="0">
+              <a:buNone/>
+              <a:tabLst>
+                <a:tab pos="1017588" algn="l"/>
+                <a:tab pos="1017588" algn="l"/>
+                <a:tab pos="1017588" algn="l"/>
+              </a:tabLst>
+            </a:pPr>
+            <a:endParaRPr lang="es-PE" sz="3000" dirty="0"/>
           </a:p>
         </p:txBody>
       </p:sp>
     </p:spTree>
     <p:extLst>
       <p:ext uri="{BB962C8B-B14F-4D97-AF65-F5344CB8AC3E}">
-        <p14:creationId xmlns:p14="http://schemas.microsoft.com/office/powerpoint/2010/main" val="2432363482"/>
+        <p14:creationId xmlns:p14="http://schemas.microsoft.com/office/powerpoint/2010/main" val="2275768977"/>
       </p:ext>
     </p:extLst>
   </p:cSld>
@@ -9310,21 +9431,20 @@
         </p:nvSpPr>
         <p:spPr/>
         <p:txBody>
-          <a:bodyPr>
-            <a:normAutofit/>
-          </a:bodyPr>
-          <a:lstStyle/>
-          <a:p>
-            <a:r>
-              <a:rPr lang="es-PE"/>
-              <a:t>Volviendo a la biodiversidad</a:t>
-            </a:r>
-          </a:p>
-        </p:txBody>
-      </p:sp>
-      <p:sp>
-        <p:nvSpPr>
-          <p:cNvPr id="3" name="Content Placeholder 2"/>
+          <a:bodyPr/>
+          <a:lstStyle/>
+          <a:p>
+            <a:r>
+              <a:rPr lang="en-US" dirty="0" err="1"/>
+              <a:t>Objetivos</a:t>
+            </a:r>
+            <a:endParaRPr lang="en-US" dirty="0"/>
+          </a:p>
+        </p:txBody>
+      </p:sp>
+      <p:sp>
+        <p:nvSpPr>
+          <p:cNvPr id="6" name="Content Placeholder 5"/>
           <p:cNvSpPr>
             <a:spLocks noGrp="1"/>
           </p:cNvSpPr>
@@ -9334,158 +9454,31 @@
         </p:nvSpPr>
         <p:spPr/>
         <p:txBody>
-          <a:bodyPr>
-            <a:normAutofit fontScale="85000" lnSpcReduction="20000"/>
-          </a:bodyPr>
-          <a:lstStyle/>
-          <a:p>
-            <a:pPr marL="349355" indent="0">
-              <a:buNone/>
-              <a:tabLst>
-                <a:tab pos="1017588" algn="l"/>
-                <a:tab pos="1017588" algn="l"/>
-                <a:tab pos="1017588" algn="l"/>
-              </a:tabLst>
-            </a:pPr>
-            <a:endParaRPr lang="es-PE" sz="3600" dirty="0"/>
-          </a:p>
-          <a:p>
-            <a:pPr marL="349355" indent="0">
-              <a:buNone/>
-              <a:tabLst>
-                <a:tab pos="1017588" algn="l"/>
-                <a:tab pos="1017588" algn="l"/>
-                <a:tab pos="1017588" algn="l"/>
-              </a:tabLst>
-            </a:pPr>
-            <a:r>
-              <a:rPr lang="es-PE" sz="3600" dirty="0" err="1"/>
-              <a:t>Magurran</a:t>
-            </a:r>
-            <a:r>
-              <a:rPr lang="es-PE" sz="3600" dirty="0"/>
-              <a:t>:</a:t>
-            </a:r>
-          </a:p>
-          <a:p>
-            <a:pPr marL="692255" indent="-342900">
-              <a:tabLst>
-                <a:tab pos="1017588" algn="l"/>
-                <a:tab pos="1017588" algn="l"/>
-                <a:tab pos="1017588" algn="l"/>
-              </a:tabLst>
-            </a:pPr>
-            <a:endParaRPr lang="es-PE" sz="2800" dirty="0"/>
-          </a:p>
-          <a:p>
-            <a:pPr marL="692255" indent="-342900">
-              <a:tabLst>
-                <a:tab pos="1017588" algn="l"/>
-                <a:tab pos="1017588" algn="l"/>
-                <a:tab pos="1017588" algn="l"/>
-              </a:tabLst>
-            </a:pPr>
-            <a:r>
-              <a:rPr lang="es-PE" sz="3200" dirty="0"/>
-              <a:t>Variedad y abundancia de especies en una unidad de estudio definida.</a:t>
-            </a:r>
-          </a:p>
-          <a:p>
-            <a:pPr marL="692255" indent="-342900">
-              <a:tabLst>
-                <a:tab pos="1017588" algn="l"/>
-                <a:tab pos="1017588" algn="l"/>
-                <a:tab pos="1017588" algn="l"/>
-              </a:tabLst>
-            </a:pPr>
-            <a:endParaRPr lang="es-PE" sz="3200" dirty="0"/>
-          </a:p>
-          <a:p>
-            <a:pPr marL="692255" indent="-342900">
-              <a:tabLst>
-                <a:tab pos="1017588" algn="l"/>
-                <a:tab pos="1017588" algn="l"/>
-                <a:tab pos="1017588" algn="l"/>
-              </a:tabLst>
-            </a:pPr>
-            <a:endParaRPr lang="es-PE" sz="3200" dirty="0"/>
-          </a:p>
-          <a:p>
-            <a:pPr marL="349355" indent="0">
-              <a:buNone/>
-              <a:tabLst>
-                <a:tab pos="1017588" algn="l"/>
-                <a:tab pos="1017588" algn="l"/>
-                <a:tab pos="1017588" algn="l"/>
-              </a:tabLst>
-            </a:pPr>
-            <a:r>
-              <a:rPr lang="es-PE" sz="3000" dirty="0"/>
-              <a:t>Biodiversidad:</a:t>
-            </a:r>
-          </a:p>
-          <a:p>
-            <a:pPr marL="692255" indent="-342900">
-              <a:tabLst>
-                <a:tab pos="1017588" algn="l"/>
-                <a:tab pos="1017588" algn="l"/>
-                <a:tab pos="1017588" algn="l"/>
-              </a:tabLst>
-            </a:pPr>
-            <a:endParaRPr lang="es-PE" sz="3200" dirty="0"/>
-          </a:p>
-          <a:p>
-            <a:pPr marL="692255" indent="-342900">
-              <a:tabLst>
-                <a:tab pos="1017588" algn="l"/>
-                <a:tab pos="1017588" algn="l"/>
-                <a:tab pos="1017588" algn="l"/>
-              </a:tabLst>
-            </a:pPr>
-            <a:r>
-              <a:rPr lang="es-PE" sz="3200" dirty="0"/>
-              <a:t>Totalidad de genes, especies, y ecosistemas de una región</a:t>
-            </a:r>
-          </a:p>
-          <a:p>
-            <a:pPr marL="712240" lvl="1" indent="0">
-              <a:buNone/>
-              <a:tabLst>
-                <a:tab pos="1017588" algn="l"/>
-                <a:tab pos="1017588" algn="l"/>
-                <a:tab pos="1017588" algn="l"/>
-              </a:tabLst>
-            </a:pPr>
-            <a:endParaRPr lang="es-PE" sz="2900" dirty="0"/>
-          </a:p>
-          <a:p>
-            <a:pPr marL="349355" indent="0">
-              <a:buNone/>
-              <a:tabLst>
-                <a:tab pos="1017588" algn="l"/>
-                <a:tab pos="1017588" algn="l"/>
-                <a:tab pos="1017588" algn="l"/>
-              </a:tabLst>
-            </a:pPr>
-            <a:endParaRPr lang="es-PE" sz="3200" dirty="0"/>
-          </a:p>
-          <a:p>
-            <a:pPr marL="349355" indent="0">
-              <a:buNone/>
-              <a:tabLst>
-                <a:tab pos="1017588" algn="l"/>
-                <a:tab pos="1017588" algn="l"/>
-                <a:tab pos="1017588" algn="l"/>
-              </a:tabLst>
-            </a:pPr>
-            <a:endParaRPr lang="es-PE" sz="3000" dirty="0"/>
+          <a:bodyPr/>
+          <a:lstStyle/>
+          <a:p>
+            <a:r>
+              <a:rPr lang="es-PE" dirty="0"/>
+              <a:t>Comparar y contrastar análisis de genes funcionales y taxonómicos</a:t>
+            </a:r>
+          </a:p>
+          <a:p>
+            <a:r>
+              <a:rPr lang="es-PE" dirty="0"/>
+              <a:t>Entender que es un modelo de </a:t>
+            </a:r>
+            <a:r>
+              <a:rPr lang="es-PE" dirty="0" err="1"/>
+              <a:t>Hammer</a:t>
+            </a:r>
+            <a:endParaRPr lang="es-PE" dirty="0"/>
           </a:p>
         </p:txBody>
       </p:sp>
     </p:spTree>
     <p:extLst>
       <p:ext uri="{BB962C8B-B14F-4D97-AF65-F5344CB8AC3E}">
-        <p14:creationId xmlns:p14="http://schemas.microsoft.com/office/powerpoint/2010/main" val="2275768977"/>
+        <p14:creationId xmlns:p14="http://schemas.microsoft.com/office/powerpoint/2010/main" val="2432363482"/>
       </p:ext>
     </p:extLst>
   </p:cSld>

</xml_diff>